<commit_message>
two zone, density plots, start validity checks
</commit_message>
<xml_diff>
--- a/icon.pptx
+++ b/icon.pptx
@@ -197,7 +197,7 @@
           <a:p>
             <a:fld id="{571AD411-4EB9-4A21-943B-1B9847AFDB51}" type="datetimeFigureOut">
               <a:rPr lang="en-GB" smtClean="0"/>
-              <a:t>27/07/2022</a:t>
+              <a:t>12/09/2022</a:t>
             </a:fld>
             <a:endParaRPr lang="en-GB" dirty="0"/>
           </a:p>
@@ -614,7 +614,7 @@
           <a:p>
             <a:fld id="{F7B63445-AF2B-4111-8DC0-98CBEBD24AAC}" type="datetime1">
               <a:rPr lang="en-GB" smtClean="0"/>
-              <a:t>27/07/2022</a:t>
+              <a:t>12/09/2022</a:t>
             </a:fld>
             <a:endParaRPr lang="en-GB" dirty="0"/>
           </a:p>
@@ -818,7 +818,7 @@
           <a:p>
             <a:fld id="{46CCC3FF-1561-4925-A5FB-88EFE4C82A0F}" type="datetime1">
               <a:rPr lang="en-GB" smtClean="0"/>
-              <a:t>27/07/2022</a:t>
+              <a:t>12/09/2022</a:t>
             </a:fld>
             <a:endParaRPr lang="en-GB" dirty="0"/>
           </a:p>
@@ -1032,7 +1032,7 @@
           <a:p>
             <a:fld id="{EEEC14B5-7CEE-4E56-BCC6-9C09DFC3AFB9}" type="datetime1">
               <a:rPr lang="en-GB" smtClean="0"/>
-              <a:t>27/07/2022</a:t>
+              <a:t>12/09/2022</a:t>
             </a:fld>
             <a:endParaRPr lang="en-GB" dirty="0"/>
           </a:p>
@@ -1236,7 +1236,7 @@
           <a:p>
             <a:fld id="{7F832F60-926E-4C0B-8BC5-217D52E268A3}" type="datetime1">
               <a:rPr lang="en-GB" smtClean="0"/>
-              <a:t>27/07/2022</a:t>
+              <a:t>12/09/2022</a:t>
             </a:fld>
             <a:endParaRPr lang="en-GB" dirty="0"/>
           </a:p>
@@ -1516,7 +1516,7 @@
           <a:p>
             <a:fld id="{8B35859E-799F-4DDF-B131-4840429D037E}" type="datetime1">
               <a:rPr lang="en-GB" smtClean="0"/>
-              <a:t>27/07/2022</a:t>
+              <a:t>12/09/2022</a:t>
             </a:fld>
             <a:endParaRPr lang="en-GB" dirty="0"/>
           </a:p>
@@ -1788,7 +1788,7 @@
           <a:p>
             <a:fld id="{667E2A73-F814-4D8C-B2FF-9238460484A6}" type="datetime1">
               <a:rPr lang="en-GB" smtClean="0"/>
-              <a:t>27/07/2022</a:t>
+              <a:t>12/09/2022</a:t>
             </a:fld>
             <a:endParaRPr lang="en-GB" dirty="0"/>
           </a:p>
@@ -2207,7 +2207,7 @@
           <a:p>
             <a:fld id="{83A6A015-07D5-4E4E-9C2B-71053B3011FB}" type="datetime1">
               <a:rPr lang="en-GB" smtClean="0"/>
-              <a:t>27/07/2022</a:t>
+              <a:t>12/09/2022</a:t>
             </a:fld>
             <a:endParaRPr lang="en-GB" dirty="0"/>
           </a:p>
@@ -2353,7 +2353,7 @@
           <a:p>
             <a:fld id="{0698F2B7-5605-4EEE-9C10-847B95169657}" type="datetime1">
               <a:rPr lang="en-GB" smtClean="0"/>
-              <a:t>27/07/2022</a:t>
+              <a:t>12/09/2022</a:t>
             </a:fld>
             <a:endParaRPr lang="en-GB" dirty="0"/>
           </a:p>
@@ -2470,7 +2470,7 @@
           <a:p>
             <a:fld id="{D0CB0D14-72D7-494C-9809-8E12D84411E9}" type="datetime1">
               <a:rPr lang="en-GB" smtClean="0"/>
-              <a:t>27/07/2022</a:t>
+              <a:t>12/09/2022</a:t>
             </a:fld>
             <a:endParaRPr lang="en-GB" dirty="0"/>
           </a:p>
@@ -2787,7 +2787,7 @@
           <a:p>
             <a:fld id="{A0AF6726-2217-4994-BD76-EB3D274AFECE}" type="datetime1">
               <a:rPr lang="en-GB" smtClean="0"/>
-              <a:t>27/07/2022</a:t>
+              <a:t>12/09/2022</a:t>
             </a:fld>
             <a:endParaRPr lang="en-GB" dirty="0"/>
           </a:p>
@@ -3080,7 +3080,7 @@
           <a:p>
             <a:fld id="{06D99D2B-7CF4-4F87-A58D-77CFE3A438E8}" type="datetime1">
               <a:rPr lang="en-GB" smtClean="0"/>
-              <a:t>27/07/2022</a:t>
+              <a:t>12/09/2022</a:t>
             </a:fld>
             <a:endParaRPr lang="en-GB" dirty="0"/>
           </a:p>
@@ -3327,7 +3327,7 @@
           <a:p>
             <a:fld id="{B90A69E1-23B2-4E79-8937-FAA5F6BE2028}" type="datetime1">
               <a:rPr lang="en-GB" smtClean="0"/>
-              <a:t>27/07/2022</a:t>
+              <a:t>12/09/2022</a:t>
             </a:fld>
             <a:endParaRPr lang="en-GB" dirty="0"/>
           </a:p>
@@ -3772,6 +3772,11 @@
           <a:solidFill>
             <a:srgbClr val="7030A0"/>
           </a:solidFill>
+          <a:ln>
+            <a:solidFill>
+              <a:schemeClr val="tx1"/>
+            </a:solidFill>
+          </a:ln>
         </p:spPr>
         <p:style>
           <a:lnRef idx="2">
@@ -3821,6 +3826,11 @@
           <a:solidFill>
             <a:srgbClr val="0000CC"/>
           </a:solidFill>
+          <a:ln>
+            <a:solidFill>
+              <a:schemeClr val="tx1"/>
+            </a:solidFill>
+          </a:ln>
         </p:spPr>
         <p:style>
           <a:lnRef idx="2">
@@ -3870,6 +3880,11 @@
           <a:solidFill>
             <a:srgbClr val="0000FF"/>
           </a:solidFill>
+          <a:ln>
+            <a:solidFill>
+              <a:schemeClr val="tx1"/>
+            </a:solidFill>
+          </a:ln>
         </p:spPr>
         <p:style>
           <a:lnRef idx="2">
@@ -3921,6 +3936,11 @@
               <a:lumMod val="50000"/>
             </a:schemeClr>
           </a:solidFill>
+          <a:ln>
+            <a:solidFill>
+              <a:schemeClr val="tx1"/>
+            </a:solidFill>
+          </a:ln>
         </p:spPr>
         <p:style>
           <a:lnRef idx="2">
@@ -3972,6 +3992,11 @@
               <a:lumMod val="75000"/>
             </a:schemeClr>
           </a:solidFill>
+          <a:ln>
+            <a:solidFill>
+              <a:schemeClr val="tx1"/>
+            </a:solidFill>
+          </a:ln>
         </p:spPr>
         <p:style>
           <a:lnRef idx="2">
@@ -4000,10 +4025,10 @@
       </p:sp>
       <p:sp>
         <p:nvSpPr>
-          <p:cNvPr id="16" name="Oval 15">
-            <a:extLst>
-              <a:ext uri="{FF2B5EF4-FFF2-40B4-BE49-F238E27FC236}">
-                <a16:creationId xmlns:a16="http://schemas.microsoft.com/office/drawing/2014/main" id="{7CA8FB59-EBCC-A0ED-D359-D526BC1749A4}"/>
+          <p:cNvPr id="3" name="Oval 2">
+            <a:extLst>
+              <a:ext uri="{FF2B5EF4-FFF2-40B4-BE49-F238E27FC236}">
+                <a16:creationId xmlns:a16="http://schemas.microsoft.com/office/drawing/2014/main" id="{A1F06CC0-8C0B-FE52-BBB7-55031377DC4A}"/>
               </a:ext>
             </a:extLst>
           </p:cNvPr>
@@ -4012,8 +4037,8 @@
         </p:nvSpPr>
         <p:spPr>
           <a:xfrm>
-            <a:off x="5509260" y="2183130"/>
-            <a:ext cx="399749" cy="302502"/>
+            <a:off x="5599197" y="2152209"/>
+            <a:ext cx="324415" cy="324415"/>
           </a:xfrm>
           <a:prstGeom prst="ellipse">
             <a:avLst/>
@@ -4024,6 +4049,11 @@
               <a:lumOff val="40000"/>
             </a:schemeClr>
           </a:solidFill>
+          <a:ln>
+            <a:solidFill>
+              <a:schemeClr val="tx1"/>
+            </a:solidFill>
+          </a:ln>
         </p:spPr>
         <p:style>
           <a:lnRef idx="2">
@@ -4073,6 +4103,11 @@
           <a:solidFill>
             <a:schemeClr val="accent4"/>
           </a:solidFill>
+          <a:ln>
+            <a:solidFill>
+              <a:schemeClr val="tx1"/>
+            </a:solidFill>
+          </a:ln>
         </p:spPr>
         <p:style>
           <a:lnRef idx="2">
@@ -4168,6 +4203,11 @@
               <a:lumMod val="75000"/>
             </a:schemeClr>
           </a:solidFill>
+          <a:ln>
+            <a:solidFill>
+              <a:schemeClr val="tx1"/>
+            </a:solidFill>
+          </a:ln>
         </p:spPr>
         <p:style>
           <a:lnRef idx="2">
@@ -4217,6 +4257,11 @@
           <a:solidFill>
             <a:srgbClr val="FF6600"/>
           </a:solidFill>
+          <a:ln>
+            <a:solidFill>
+              <a:schemeClr val="tx1"/>
+            </a:solidFill>
+          </a:ln>
         </p:spPr>
         <p:style>
           <a:lnRef idx="2">
@@ -4266,6 +4311,11 @@
           <a:solidFill>
             <a:srgbClr val="FF0000"/>
           </a:solidFill>
+          <a:ln>
+            <a:solidFill>
+              <a:schemeClr val="tx1"/>
+            </a:solidFill>
+          </a:ln>
         </p:spPr>
         <p:style>
           <a:lnRef idx="2">
@@ -4315,6 +4365,11 @@
           <a:solidFill>
             <a:srgbClr val="C00000"/>
           </a:solidFill>
+          <a:ln>
+            <a:solidFill>
+              <a:schemeClr val="tx1"/>
+            </a:solidFill>
+          </a:ln>
         </p:spPr>
         <p:style>
           <a:lnRef idx="2">
@@ -4357,7 +4412,7 @@
         </p:nvCxnSpPr>
         <p:spPr>
           <a:xfrm>
-            <a:off x="4499500" y="3579251"/>
+            <a:off x="4491188" y="3591719"/>
             <a:ext cx="2542408" cy="0"/>
           </a:xfrm>
           <a:prstGeom prst="straightConnector1">

</xml_diff>